<commit_message>
commit avant refonte de la bibliothèque
les capteurs vont être définis dans le code principal et non plus dans le fichiers.cpp
</commit_message>
<xml_diff>
--- a/Carte.pptx
+++ b/Carte.pptx
@@ -32850,6 +32850,1262 @@
           </a:p>
         </p:txBody>
       </p:sp>
+      <p:graphicFrame>
+        <p:nvGraphicFramePr>
+          <p:cNvPr id="2" name="Tableau 1">
+            <a:extLst>
+              <a:ext uri="{FF2B5EF4-FFF2-40B4-BE49-F238E27FC236}">
+                <a16:creationId xmlns:a16="http://schemas.microsoft.com/office/drawing/2014/main" id="{8C2135AB-A4B3-4D04-95EA-86F625899251}"/>
+              </a:ext>
+            </a:extLst>
+          </p:cNvPr>
+          <p:cNvGraphicFramePr>
+            <a:graphicFrameLocks noGrp="1"/>
+          </p:cNvGraphicFramePr>
+          <p:nvPr>
+            <p:extLst>
+              <p:ext uri="{D42A27DB-BD31-4B8C-83A1-F6EECF244321}">
+                <p14:modId xmlns:p14="http://schemas.microsoft.com/office/powerpoint/2010/main" val="2613143583"/>
+              </p:ext>
+            </p:extLst>
+          </p:nvPr>
+        </p:nvGraphicFramePr>
+        <p:xfrm>
+          <a:off x="-3121619" y="-138055"/>
+          <a:ext cx="2577659" cy="6477555"/>
+        </p:xfrm>
+        <a:graphic>
+          <a:graphicData uri="http://schemas.openxmlformats.org/drawingml/2006/table">
+            <a:tbl>
+              <a:tblPr>
+                <a:tableStyleId>{5C22544A-7EE6-4342-B048-85BDC9FD1C3A}</a:tableStyleId>
+              </a:tblPr>
+              <a:tblGrid>
+                <a:gridCol w="575427">
+                  <a:extLst>
+                    <a:ext uri="{9D8B030D-6E8A-4147-A177-3AD203B41FA5}">
+                      <a16:colId xmlns:a16="http://schemas.microsoft.com/office/drawing/2014/main" val="2886069703"/>
+                    </a:ext>
+                  </a:extLst>
+                </a:gridCol>
+                <a:gridCol w="2002232">
+                  <a:extLst>
+                    <a:ext uri="{9D8B030D-6E8A-4147-A177-3AD203B41FA5}">
+                      <a16:colId xmlns:a16="http://schemas.microsoft.com/office/drawing/2014/main" val="1923889105"/>
+                    </a:ext>
+                  </a:extLst>
+                </a:gridCol>
+              </a:tblGrid>
+              <a:tr h="407588">
+                <a:tc>
+                  <a:txBody>
+                    <a:bodyPr/>
+                    <a:lstStyle/>
+                    <a:p>
+                      <a:pPr algn="l" fontAlgn="b"/>
+                      <a:endParaRPr lang="fr-FR" sz="1200" b="0" i="0" u="none" strike="noStrike">
+                        <a:solidFill>
+                          <a:srgbClr val="000000"/>
+                        </a:solidFill>
+                        <a:effectLst/>
+                        <a:latin typeface="Calibri" panose="020F0502020204030204" pitchFamily="34" charset="0"/>
+                      </a:endParaRPr>
+                    </a:p>
+                  </a:txBody>
+                  <a:tcPr marL="5359" marR="5359" marT="5359" marB="0" anchor="b"/>
+                </a:tc>
+                <a:tc>
+                  <a:txBody>
+                    <a:bodyPr/>
+                    <a:lstStyle/>
+                    <a:p>
+                      <a:pPr algn="l" fontAlgn="b"/>
+                      <a:r>
+                        <a:rPr lang="fr-FR" sz="2000" u="none" strike="noStrike">
+                          <a:effectLst/>
+                        </a:rPr>
+                        <a:t>Sensor Nano</a:t>
+                      </a:r>
+                      <a:endParaRPr lang="fr-FR" sz="2000" b="0" i="0" u="none" strike="noStrike">
+                        <a:solidFill>
+                          <a:srgbClr val="000000"/>
+                        </a:solidFill>
+                        <a:effectLst/>
+                        <a:latin typeface="Calibri" panose="020F0502020204030204" pitchFamily="34" charset="0"/>
+                      </a:endParaRPr>
+                    </a:p>
+                  </a:txBody>
+                  <a:tcPr marL="5359" marR="5359" marT="5359" marB="0" anchor="b"/>
+                </a:tc>
+                <a:extLst>
+                  <a:ext uri="{0D108BD9-81ED-4DB2-BD59-A6C34878D82A}">
+                    <a16:rowId xmlns:a16="http://schemas.microsoft.com/office/drawing/2014/main" val="856879035"/>
+                  </a:ext>
+                </a:extLst>
+              </a:tr>
+              <a:tr h="255495">
+                <a:tc>
+                  <a:txBody>
+                    <a:bodyPr/>
+                    <a:lstStyle/>
+                    <a:p>
+                      <a:pPr algn="r" fontAlgn="b"/>
+                      <a:r>
+                        <a:rPr lang="fr-FR" sz="1600" u="none" strike="noStrike">
+                          <a:effectLst/>
+                        </a:rPr>
+                        <a:t>0</a:t>
+                      </a:r>
+                      <a:endParaRPr lang="fr-FR" sz="1600" b="1" i="0" u="none" strike="noStrike">
+                        <a:solidFill>
+                          <a:srgbClr val="000000"/>
+                        </a:solidFill>
+                        <a:effectLst/>
+                        <a:latin typeface="Calibri" panose="020F0502020204030204" pitchFamily="34" charset="0"/>
+                      </a:endParaRPr>
+                    </a:p>
+                  </a:txBody>
+                  <a:tcPr marL="5359" marR="5359" marT="5359" marB="0" anchor="b"/>
+                </a:tc>
+                <a:tc>
+                  <a:txBody>
+                    <a:bodyPr/>
+                    <a:lstStyle/>
+                    <a:p>
+                      <a:pPr algn="l" fontAlgn="b"/>
+                      <a:endParaRPr lang="fr-FR" sz="1200" b="0" i="0" u="none" strike="noStrike">
+                        <a:solidFill>
+                          <a:srgbClr val="000000"/>
+                        </a:solidFill>
+                        <a:effectLst/>
+                        <a:latin typeface="Calibri" panose="020F0502020204030204" pitchFamily="34" charset="0"/>
+                      </a:endParaRPr>
+                    </a:p>
+                  </a:txBody>
+                  <a:tcPr marL="5359" marR="5359" marT="5359" marB="0" anchor="b"/>
+                </a:tc>
+                <a:extLst>
+                  <a:ext uri="{0D108BD9-81ED-4DB2-BD59-A6C34878D82A}">
+                    <a16:rowId xmlns:a16="http://schemas.microsoft.com/office/drawing/2014/main" val="3232102560"/>
+                  </a:ext>
+                </a:extLst>
+              </a:tr>
+              <a:tr h="255495">
+                <a:tc>
+                  <a:txBody>
+                    <a:bodyPr/>
+                    <a:lstStyle/>
+                    <a:p>
+                      <a:pPr algn="r" fontAlgn="b"/>
+                      <a:r>
+                        <a:rPr lang="fr-FR" sz="1600" u="none" strike="noStrike">
+                          <a:effectLst/>
+                        </a:rPr>
+                        <a:t>1</a:t>
+                      </a:r>
+                      <a:endParaRPr lang="fr-FR" sz="1600" b="1" i="0" u="none" strike="noStrike">
+                        <a:solidFill>
+                          <a:srgbClr val="000000"/>
+                        </a:solidFill>
+                        <a:effectLst/>
+                        <a:latin typeface="Calibri" panose="020F0502020204030204" pitchFamily="34" charset="0"/>
+                      </a:endParaRPr>
+                    </a:p>
+                  </a:txBody>
+                  <a:tcPr marL="5359" marR="5359" marT="5359" marB="0" anchor="b"/>
+                </a:tc>
+                <a:tc>
+                  <a:txBody>
+                    <a:bodyPr/>
+                    <a:lstStyle/>
+                    <a:p>
+                      <a:pPr algn="l" fontAlgn="b"/>
+                      <a:endParaRPr lang="fr-FR" sz="1200" b="0" i="0" u="none" strike="noStrike">
+                        <a:solidFill>
+                          <a:srgbClr val="000000"/>
+                        </a:solidFill>
+                        <a:effectLst/>
+                        <a:latin typeface="Calibri" panose="020F0502020204030204" pitchFamily="34" charset="0"/>
+                      </a:endParaRPr>
+                    </a:p>
+                  </a:txBody>
+                  <a:tcPr marL="5359" marR="5359" marT="5359" marB="0" anchor="b"/>
+                </a:tc>
+                <a:extLst>
+                  <a:ext uri="{0D108BD9-81ED-4DB2-BD59-A6C34878D82A}">
+                    <a16:rowId xmlns:a16="http://schemas.microsoft.com/office/drawing/2014/main" val="264649448"/>
+                  </a:ext>
+                </a:extLst>
+              </a:tr>
+              <a:tr h="255495">
+                <a:tc>
+                  <a:txBody>
+                    <a:bodyPr/>
+                    <a:lstStyle/>
+                    <a:p>
+                      <a:pPr algn="r" fontAlgn="b"/>
+                      <a:r>
+                        <a:rPr lang="fr-FR" sz="1600" u="none" strike="noStrike">
+                          <a:effectLst/>
+                        </a:rPr>
+                        <a:t>2</a:t>
+                      </a:r>
+                      <a:endParaRPr lang="fr-FR" sz="1600" b="1" i="0" u="none" strike="noStrike">
+                        <a:solidFill>
+                          <a:srgbClr val="000000"/>
+                        </a:solidFill>
+                        <a:effectLst/>
+                        <a:latin typeface="Calibri" panose="020F0502020204030204" pitchFamily="34" charset="0"/>
+                      </a:endParaRPr>
+                    </a:p>
+                  </a:txBody>
+                  <a:tcPr marL="5359" marR="5359" marT="5359" marB="0" anchor="b"/>
+                </a:tc>
+                <a:tc>
+                  <a:txBody>
+                    <a:bodyPr/>
+                    <a:lstStyle/>
+                    <a:p>
+                      <a:pPr algn="l" fontAlgn="b"/>
+                      <a:r>
+                        <a:rPr lang="fr-FR" sz="1200" u="none" strike="noStrike">
+                          <a:effectLst/>
+                        </a:rPr>
+                        <a:t>DIO0</a:t>
+                      </a:r>
+                      <a:endParaRPr lang="fr-FR" sz="1200" b="0" i="0" u="none" strike="noStrike">
+                        <a:solidFill>
+                          <a:srgbClr val="000000"/>
+                        </a:solidFill>
+                        <a:effectLst/>
+                        <a:latin typeface="Calibri" panose="020F0502020204030204" pitchFamily="34" charset="0"/>
+                      </a:endParaRPr>
+                    </a:p>
+                  </a:txBody>
+                  <a:tcPr marL="5359" marR="5359" marT="5359" marB="0" anchor="b"/>
+                </a:tc>
+                <a:extLst>
+                  <a:ext uri="{0D108BD9-81ED-4DB2-BD59-A6C34878D82A}">
+                    <a16:rowId xmlns:a16="http://schemas.microsoft.com/office/drawing/2014/main" val="3388206216"/>
+                  </a:ext>
+                </a:extLst>
+              </a:tr>
+              <a:tr h="270772">
+                <a:tc>
+                  <a:txBody>
+                    <a:bodyPr/>
+                    <a:lstStyle/>
+                    <a:p>
+                      <a:pPr algn="r" fontAlgn="b"/>
+                      <a:r>
+                        <a:rPr lang="fr-FR" sz="1600" u="none" strike="noStrike">
+                          <a:effectLst/>
+                        </a:rPr>
+                        <a:t>3</a:t>
+                      </a:r>
+                      <a:endParaRPr lang="fr-FR" sz="1600" b="1" i="0" u="none" strike="noStrike">
+                        <a:solidFill>
+                          <a:srgbClr val="000000"/>
+                        </a:solidFill>
+                        <a:effectLst/>
+                        <a:latin typeface="Calibri" panose="020F0502020204030204" pitchFamily="34" charset="0"/>
+                      </a:endParaRPr>
+                    </a:p>
+                  </a:txBody>
+                  <a:tcPr marL="5359" marR="5359" marT="5359" marB="0" anchor="b"/>
+                </a:tc>
+                <a:tc>
+                  <a:txBody>
+                    <a:bodyPr/>
+                    <a:lstStyle/>
+                    <a:p>
+                      <a:pPr algn="l" fontAlgn="b"/>
+                      <a:r>
+                        <a:rPr lang="fr-FR" sz="1200" u="none" strike="noStrike">
+                          <a:effectLst/>
+                        </a:rPr>
+                        <a:t>Anemometre</a:t>
+                      </a:r>
+                      <a:endParaRPr lang="fr-FR" sz="1200" b="0" i="0" u="none" strike="noStrike">
+                        <a:solidFill>
+                          <a:srgbClr val="000000"/>
+                        </a:solidFill>
+                        <a:effectLst/>
+                        <a:latin typeface="Calibri" panose="020F0502020204030204" pitchFamily="34" charset="0"/>
+                      </a:endParaRPr>
+                    </a:p>
+                  </a:txBody>
+                  <a:tcPr marL="5359" marR="5359" marT="5359" marB="0" anchor="b"/>
+                </a:tc>
+                <a:extLst>
+                  <a:ext uri="{0D108BD9-81ED-4DB2-BD59-A6C34878D82A}">
+                    <a16:rowId xmlns:a16="http://schemas.microsoft.com/office/drawing/2014/main" val="3482107091"/>
+                  </a:ext>
+                </a:extLst>
+              </a:tr>
+              <a:tr h="255495">
+                <a:tc>
+                  <a:txBody>
+                    <a:bodyPr/>
+                    <a:lstStyle/>
+                    <a:p>
+                      <a:pPr algn="r" fontAlgn="b"/>
+                      <a:r>
+                        <a:rPr lang="fr-FR" sz="1600" u="none" strike="noStrike">
+                          <a:effectLst/>
+                        </a:rPr>
+                        <a:t>4</a:t>
+                      </a:r>
+                      <a:endParaRPr lang="fr-FR" sz="1600" b="1" i="0" u="none" strike="noStrike">
+                        <a:solidFill>
+                          <a:srgbClr val="000000"/>
+                        </a:solidFill>
+                        <a:effectLst/>
+                        <a:latin typeface="Calibri" panose="020F0502020204030204" pitchFamily="34" charset="0"/>
+                      </a:endParaRPr>
+                    </a:p>
+                  </a:txBody>
+                  <a:tcPr marL="5359" marR="5359" marT="5359" marB="0" anchor="b"/>
+                </a:tc>
+                <a:tc>
+                  <a:txBody>
+                    <a:bodyPr/>
+                    <a:lstStyle/>
+                    <a:p>
+                      <a:pPr algn="l" fontAlgn="b"/>
+                      <a:r>
+                        <a:rPr lang="fr-FR" sz="1200" u="none" strike="noStrike">
+                          <a:effectLst/>
+                        </a:rPr>
+                        <a:t>Pluviometre</a:t>
+                      </a:r>
+                      <a:endParaRPr lang="fr-FR" sz="1200" b="0" i="0" u="none" strike="noStrike">
+                        <a:solidFill>
+                          <a:srgbClr val="000000"/>
+                        </a:solidFill>
+                        <a:effectLst/>
+                        <a:latin typeface="Calibri" panose="020F0502020204030204" pitchFamily="34" charset="0"/>
+                      </a:endParaRPr>
+                    </a:p>
+                  </a:txBody>
+                  <a:tcPr marL="5359" marR="5359" marT="5359" marB="0" anchor="b"/>
+                </a:tc>
+                <a:extLst>
+                  <a:ext uri="{0D108BD9-81ED-4DB2-BD59-A6C34878D82A}">
+                    <a16:rowId xmlns:a16="http://schemas.microsoft.com/office/drawing/2014/main" val="3116477140"/>
+                  </a:ext>
+                </a:extLst>
+              </a:tr>
+              <a:tr h="255495">
+                <a:tc>
+                  <a:txBody>
+                    <a:bodyPr/>
+                    <a:lstStyle/>
+                    <a:p>
+                      <a:pPr algn="r" fontAlgn="b"/>
+                      <a:r>
+                        <a:rPr lang="fr-FR" sz="1600" u="none" strike="noStrike">
+                          <a:effectLst/>
+                        </a:rPr>
+                        <a:t>5</a:t>
+                      </a:r>
+                      <a:endParaRPr lang="fr-FR" sz="1600" b="1" i="0" u="none" strike="noStrike">
+                        <a:solidFill>
+                          <a:srgbClr val="000000"/>
+                        </a:solidFill>
+                        <a:effectLst/>
+                        <a:latin typeface="Calibri" panose="020F0502020204030204" pitchFamily="34" charset="0"/>
+                      </a:endParaRPr>
+                    </a:p>
+                  </a:txBody>
+                  <a:tcPr marL="5359" marR="5359" marT="5359" marB="0" anchor="b"/>
+                </a:tc>
+                <a:tc>
+                  <a:txBody>
+                    <a:bodyPr/>
+                    <a:lstStyle/>
+                    <a:p>
+                      <a:pPr algn="l" fontAlgn="b"/>
+                      <a:r>
+                        <a:rPr lang="fr-FR" sz="1200" u="none" strike="noStrike">
+                          <a:effectLst/>
+                        </a:rPr>
+                        <a:t>DHT22</a:t>
+                      </a:r>
+                      <a:endParaRPr lang="fr-FR" sz="1200" b="0" i="0" u="none" strike="noStrike">
+                        <a:solidFill>
+                          <a:srgbClr val="000000"/>
+                        </a:solidFill>
+                        <a:effectLst/>
+                        <a:latin typeface="Calibri" panose="020F0502020204030204" pitchFamily="34" charset="0"/>
+                      </a:endParaRPr>
+                    </a:p>
+                  </a:txBody>
+                  <a:tcPr marL="5359" marR="5359" marT="5359" marB="0" anchor="b"/>
+                </a:tc>
+                <a:extLst>
+                  <a:ext uri="{0D108BD9-81ED-4DB2-BD59-A6C34878D82A}">
+                    <a16:rowId xmlns:a16="http://schemas.microsoft.com/office/drawing/2014/main" val="3634391106"/>
+                  </a:ext>
+                </a:extLst>
+              </a:tr>
+              <a:tr h="255495">
+                <a:tc>
+                  <a:txBody>
+                    <a:bodyPr/>
+                    <a:lstStyle/>
+                    <a:p>
+                      <a:pPr algn="r" fontAlgn="b"/>
+                      <a:r>
+                        <a:rPr lang="fr-FR" sz="1600" u="none" strike="noStrike">
+                          <a:effectLst/>
+                        </a:rPr>
+                        <a:t>6</a:t>
+                      </a:r>
+                      <a:endParaRPr lang="fr-FR" sz="1600" b="1" i="0" u="none" strike="noStrike">
+                        <a:solidFill>
+                          <a:srgbClr val="000000"/>
+                        </a:solidFill>
+                        <a:effectLst/>
+                        <a:latin typeface="Calibri" panose="020F0502020204030204" pitchFamily="34" charset="0"/>
+                      </a:endParaRPr>
+                    </a:p>
+                  </a:txBody>
+                  <a:tcPr marL="5359" marR="5359" marT="5359" marB="0" anchor="b"/>
+                </a:tc>
+                <a:tc>
+                  <a:txBody>
+                    <a:bodyPr/>
+                    <a:lstStyle/>
+                    <a:p>
+                      <a:pPr algn="l" fontAlgn="b"/>
+                      <a:endParaRPr lang="fr-FR" sz="1200" b="0" i="0" u="none" strike="noStrike">
+                        <a:solidFill>
+                          <a:srgbClr val="000000"/>
+                        </a:solidFill>
+                        <a:effectLst/>
+                        <a:latin typeface="Calibri" panose="020F0502020204030204" pitchFamily="34" charset="0"/>
+                      </a:endParaRPr>
+                    </a:p>
+                  </a:txBody>
+                  <a:tcPr marL="5359" marR="5359" marT="5359" marB="0" anchor="b"/>
+                </a:tc>
+                <a:extLst>
+                  <a:ext uri="{0D108BD9-81ED-4DB2-BD59-A6C34878D82A}">
+                    <a16:rowId xmlns:a16="http://schemas.microsoft.com/office/drawing/2014/main" val="2947003339"/>
+                  </a:ext>
+                </a:extLst>
+              </a:tr>
+              <a:tr h="255495">
+                <a:tc>
+                  <a:txBody>
+                    <a:bodyPr/>
+                    <a:lstStyle/>
+                    <a:p>
+                      <a:pPr algn="r" fontAlgn="b"/>
+                      <a:r>
+                        <a:rPr lang="fr-FR" sz="1600" u="none" strike="noStrike">
+                          <a:effectLst/>
+                        </a:rPr>
+                        <a:t>7</a:t>
+                      </a:r>
+                      <a:endParaRPr lang="fr-FR" sz="1600" b="1" i="0" u="none" strike="noStrike">
+                        <a:solidFill>
+                          <a:srgbClr val="000000"/>
+                        </a:solidFill>
+                        <a:effectLst/>
+                        <a:latin typeface="Calibri" panose="020F0502020204030204" pitchFamily="34" charset="0"/>
+                      </a:endParaRPr>
+                    </a:p>
+                  </a:txBody>
+                  <a:tcPr marL="5359" marR="5359" marT="5359" marB="0" anchor="b"/>
+                </a:tc>
+                <a:tc>
+                  <a:txBody>
+                    <a:bodyPr/>
+                    <a:lstStyle/>
+                    <a:p>
+                      <a:pPr algn="l" fontAlgn="b"/>
+                      <a:endParaRPr lang="fr-FR" sz="1200" b="0" i="0" u="none" strike="noStrike">
+                        <a:solidFill>
+                          <a:srgbClr val="000000"/>
+                        </a:solidFill>
+                        <a:effectLst/>
+                        <a:latin typeface="Calibri" panose="020F0502020204030204" pitchFamily="34" charset="0"/>
+                      </a:endParaRPr>
+                    </a:p>
+                  </a:txBody>
+                  <a:tcPr marL="5359" marR="5359" marT="5359" marB="0" anchor="b"/>
+                </a:tc>
+                <a:extLst>
+                  <a:ext uri="{0D108BD9-81ED-4DB2-BD59-A6C34878D82A}">
+                    <a16:rowId xmlns:a16="http://schemas.microsoft.com/office/drawing/2014/main" val="1037781097"/>
+                  </a:ext>
+                </a:extLst>
+              </a:tr>
+              <a:tr h="255495">
+                <a:tc>
+                  <a:txBody>
+                    <a:bodyPr/>
+                    <a:lstStyle/>
+                    <a:p>
+                      <a:pPr algn="r" fontAlgn="b"/>
+                      <a:r>
+                        <a:rPr lang="fr-FR" sz="1600" u="none" strike="noStrike">
+                          <a:effectLst/>
+                        </a:rPr>
+                        <a:t>8</a:t>
+                      </a:r>
+                      <a:endParaRPr lang="fr-FR" sz="1600" b="1" i="0" u="none" strike="noStrike">
+                        <a:solidFill>
+                          <a:srgbClr val="000000"/>
+                        </a:solidFill>
+                        <a:effectLst/>
+                        <a:latin typeface="Calibri" panose="020F0502020204030204" pitchFamily="34" charset="0"/>
+                      </a:endParaRPr>
+                    </a:p>
+                  </a:txBody>
+                  <a:tcPr marL="5359" marR="5359" marT="5359" marB="0" anchor="b"/>
+                </a:tc>
+                <a:tc>
+                  <a:txBody>
+                    <a:bodyPr/>
+                    <a:lstStyle/>
+                    <a:p>
+                      <a:pPr algn="l" fontAlgn="b"/>
+                      <a:endParaRPr lang="fr-FR" sz="1200" b="0" i="0" u="none" strike="noStrike">
+                        <a:solidFill>
+                          <a:srgbClr val="000000"/>
+                        </a:solidFill>
+                        <a:effectLst/>
+                        <a:latin typeface="Calibri" panose="020F0502020204030204" pitchFamily="34" charset="0"/>
+                      </a:endParaRPr>
+                    </a:p>
+                  </a:txBody>
+                  <a:tcPr marL="5359" marR="5359" marT="5359" marB="0" anchor="b"/>
+                </a:tc>
+                <a:extLst>
+                  <a:ext uri="{0D108BD9-81ED-4DB2-BD59-A6C34878D82A}">
+                    <a16:rowId xmlns:a16="http://schemas.microsoft.com/office/drawing/2014/main" val="1062653465"/>
+                  </a:ext>
+                </a:extLst>
+              </a:tr>
+              <a:tr h="255495">
+                <a:tc>
+                  <a:txBody>
+                    <a:bodyPr/>
+                    <a:lstStyle/>
+                    <a:p>
+                      <a:pPr algn="r" fontAlgn="b"/>
+                      <a:r>
+                        <a:rPr lang="fr-FR" sz="1600" u="none" strike="noStrike">
+                          <a:effectLst/>
+                        </a:rPr>
+                        <a:t>9</a:t>
+                      </a:r>
+                      <a:endParaRPr lang="fr-FR" sz="1600" b="1" i="0" u="none" strike="noStrike">
+                        <a:solidFill>
+                          <a:srgbClr val="000000"/>
+                        </a:solidFill>
+                        <a:effectLst/>
+                        <a:latin typeface="Calibri" panose="020F0502020204030204" pitchFamily="34" charset="0"/>
+                      </a:endParaRPr>
+                    </a:p>
+                  </a:txBody>
+                  <a:tcPr marL="5359" marR="5359" marT="5359" marB="0" anchor="b"/>
+                </a:tc>
+                <a:tc>
+                  <a:txBody>
+                    <a:bodyPr/>
+                    <a:lstStyle/>
+                    <a:p>
+                      <a:pPr algn="l" fontAlgn="b"/>
+                      <a:endParaRPr lang="fr-FR" sz="1200" b="0" i="0" u="none" strike="noStrike">
+                        <a:solidFill>
+                          <a:srgbClr val="000000"/>
+                        </a:solidFill>
+                        <a:effectLst/>
+                        <a:latin typeface="Calibri" panose="020F0502020204030204" pitchFamily="34" charset="0"/>
+                      </a:endParaRPr>
+                    </a:p>
+                  </a:txBody>
+                  <a:tcPr marL="5359" marR="5359" marT="5359" marB="0" anchor="b"/>
+                </a:tc>
+                <a:extLst>
+                  <a:ext uri="{0D108BD9-81ED-4DB2-BD59-A6C34878D82A}">
+                    <a16:rowId xmlns:a16="http://schemas.microsoft.com/office/drawing/2014/main" val="1500650357"/>
+                  </a:ext>
+                </a:extLst>
+              </a:tr>
+              <a:tr h="255495">
+                <a:tc>
+                  <a:txBody>
+                    <a:bodyPr/>
+                    <a:lstStyle/>
+                    <a:p>
+                      <a:pPr algn="r" fontAlgn="b"/>
+                      <a:r>
+                        <a:rPr lang="fr-FR" sz="1600" u="none" strike="noStrike">
+                          <a:effectLst/>
+                        </a:rPr>
+                        <a:t>10</a:t>
+                      </a:r>
+                      <a:endParaRPr lang="fr-FR" sz="1600" b="1" i="0" u="none" strike="noStrike">
+                        <a:solidFill>
+                          <a:srgbClr val="000000"/>
+                        </a:solidFill>
+                        <a:effectLst/>
+                        <a:latin typeface="Calibri" panose="020F0502020204030204" pitchFamily="34" charset="0"/>
+                      </a:endParaRPr>
+                    </a:p>
+                  </a:txBody>
+                  <a:tcPr marL="5359" marR="5359" marT="5359" marB="0" anchor="b"/>
+                </a:tc>
+                <a:tc>
+                  <a:txBody>
+                    <a:bodyPr/>
+                    <a:lstStyle/>
+                    <a:p>
+                      <a:pPr algn="l" fontAlgn="b"/>
+                      <a:r>
+                        <a:rPr lang="fr-FR" sz="1200" u="none" strike="noStrike">
+                          <a:effectLst/>
+                        </a:rPr>
+                        <a:t>CS radio</a:t>
+                      </a:r>
+                      <a:endParaRPr lang="fr-FR" sz="1200" b="0" i="0" u="none" strike="noStrike">
+                        <a:solidFill>
+                          <a:srgbClr val="000000"/>
+                        </a:solidFill>
+                        <a:effectLst/>
+                        <a:latin typeface="Calibri" panose="020F0502020204030204" pitchFamily="34" charset="0"/>
+                      </a:endParaRPr>
+                    </a:p>
+                  </a:txBody>
+                  <a:tcPr marL="5359" marR="5359" marT="5359" marB="0" anchor="b"/>
+                </a:tc>
+                <a:extLst>
+                  <a:ext uri="{0D108BD9-81ED-4DB2-BD59-A6C34878D82A}">
+                    <a16:rowId xmlns:a16="http://schemas.microsoft.com/office/drawing/2014/main" val="2742673325"/>
+                  </a:ext>
+                </a:extLst>
+              </a:tr>
+              <a:tr h="255495">
+                <a:tc>
+                  <a:txBody>
+                    <a:bodyPr/>
+                    <a:lstStyle/>
+                    <a:p>
+                      <a:pPr algn="r" fontAlgn="b"/>
+                      <a:r>
+                        <a:rPr lang="fr-FR" sz="1600" u="none" strike="noStrike">
+                          <a:effectLst/>
+                        </a:rPr>
+                        <a:t>11</a:t>
+                      </a:r>
+                      <a:endParaRPr lang="fr-FR" sz="1600" b="1" i="0" u="none" strike="noStrike">
+                        <a:solidFill>
+                          <a:srgbClr val="000000"/>
+                        </a:solidFill>
+                        <a:effectLst/>
+                        <a:latin typeface="Calibri" panose="020F0502020204030204" pitchFamily="34" charset="0"/>
+                      </a:endParaRPr>
+                    </a:p>
+                  </a:txBody>
+                  <a:tcPr marL="5359" marR="5359" marT="5359" marB="0" anchor="b"/>
+                </a:tc>
+                <a:tc>
+                  <a:txBody>
+                    <a:bodyPr/>
+                    <a:lstStyle/>
+                    <a:p>
+                      <a:pPr algn="l" fontAlgn="b"/>
+                      <a:r>
+                        <a:rPr lang="fr-FR" sz="1200" u="none" strike="noStrike">
+                          <a:effectLst/>
+                        </a:rPr>
+                        <a:t>MOSI</a:t>
+                      </a:r>
+                      <a:endParaRPr lang="fr-FR" sz="1200" b="0" i="0" u="none" strike="noStrike">
+                        <a:solidFill>
+                          <a:srgbClr val="000000"/>
+                        </a:solidFill>
+                        <a:effectLst/>
+                        <a:latin typeface="Calibri" panose="020F0502020204030204" pitchFamily="34" charset="0"/>
+                      </a:endParaRPr>
+                    </a:p>
+                  </a:txBody>
+                  <a:tcPr marL="5359" marR="5359" marT="5359" marB="0" anchor="b"/>
+                </a:tc>
+                <a:extLst>
+                  <a:ext uri="{0D108BD9-81ED-4DB2-BD59-A6C34878D82A}">
+                    <a16:rowId xmlns:a16="http://schemas.microsoft.com/office/drawing/2014/main" val="3811969496"/>
+                  </a:ext>
+                </a:extLst>
+              </a:tr>
+              <a:tr h="255495">
+                <a:tc>
+                  <a:txBody>
+                    <a:bodyPr/>
+                    <a:lstStyle/>
+                    <a:p>
+                      <a:pPr algn="r" fontAlgn="b"/>
+                      <a:r>
+                        <a:rPr lang="fr-FR" sz="1600" u="none" strike="noStrike">
+                          <a:effectLst/>
+                        </a:rPr>
+                        <a:t>12</a:t>
+                      </a:r>
+                      <a:endParaRPr lang="fr-FR" sz="1600" b="1" i="0" u="none" strike="noStrike">
+                        <a:solidFill>
+                          <a:srgbClr val="000000"/>
+                        </a:solidFill>
+                        <a:effectLst/>
+                        <a:latin typeface="Calibri" panose="020F0502020204030204" pitchFamily="34" charset="0"/>
+                      </a:endParaRPr>
+                    </a:p>
+                  </a:txBody>
+                  <a:tcPr marL="5359" marR="5359" marT="5359" marB="0" anchor="b"/>
+                </a:tc>
+                <a:tc>
+                  <a:txBody>
+                    <a:bodyPr/>
+                    <a:lstStyle/>
+                    <a:p>
+                      <a:pPr algn="l" fontAlgn="b"/>
+                      <a:r>
+                        <a:rPr lang="fr-FR" sz="1200" u="none" strike="noStrike">
+                          <a:effectLst/>
+                        </a:rPr>
+                        <a:t>MISO</a:t>
+                      </a:r>
+                      <a:endParaRPr lang="fr-FR" sz="1200" b="0" i="0" u="none" strike="noStrike">
+                        <a:solidFill>
+                          <a:srgbClr val="000000"/>
+                        </a:solidFill>
+                        <a:effectLst/>
+                        <a:latin typeface="Calibri" panose="020F0502020204030204" pitchFamily="34" charset="0"/>
+                      </a:endParaRPr>
+                    </a:p>
+                  </a:txBody>
+                  <a:tcPr marL="5359" marR="5359" marT="5359" marB="0" anchor="b"/>
+                </a:tc>
+                <a:extLst>
+                  <a:ext uri="{0D108BD9-81ED-4DB2-BD59-A6C34878D82A}">
+                    <a16:rowId xmlns:a16="http://schemas.microsoft.com/office/drawing/2014/main" val="4091245042"/>
+                  </a:ext>
+                </a:extLst>
+              </a:tr>
+              <a:tr h="255495">
+                <a:tc>
+                  <a:txBody>
+                    <a:bodyPr/>
+                    <a:lstStyle/>
+                    <a:p>
+                      <a:pPr algn="r" fontAlgn="b"/>
+                      <a:r>
+                        <a:rPr lang="fr-FR" sz="1600" u="none" strike="noStrike">
+                          <a:effectLst/>
+                        </a:rPr>
+                        <a:t>13</a:t>
+                      </a:r>
+                      <a:endParaRPr lang="fr-FR" sz="1600" b="1" i="0" u="none" strike="noStrike">
+                        <a:solidFill>
+                          <a:srgbClr val="000000"/>
+                        </a:solidFill>
+                        <a:effectLst/>
+                        <a:latin typeface="Calibri" panose="020F0502020204030204" pitchFamily="34" charset="0"/>
+                      </a:endParaRPr>
+                    </a:p>
+                  </a:txBody>
+                  <a:tcPr marL="5359" marR="5359" marT="5359" marB="0" anchor="b"/>
+                </a:tc>
+                <a:tc>
+                  <a:txBody>
+                    <a:bodyPr/>
+                    <a:lstStyle/>
+                    <a:p>
+                      <a:pPr algn="l" fontAlgn="b"/>
+                      <a:r>
+                        <a:rPr lang="fr-FR" sz="1200" u="none" strike="noStrike">
+                          <a:effectLst/>
+                        </a:rPr>
+                        <a:t>SCK</a:t>
+                      </a:r>
+                      <a:endParaRPr lang="fr-FR" sz="1200" b="0" i="0" u="none" strike="noStrike">
+                        <a:solidFill>
+                          <a:srgbClr val="000000"/>
+                        </a:solidFill>
+                        <a:effectLst/>
+                        <a:latin typeface="Calibri" panose="020F0502020204030204" pitchFamily="34" charset="0"/>
+                      </a:endParaRPr>
+                    </a:p>
+                  </a:txBody>
+                  <a:tcPr marL="5359" marR="5359" marT="5359" marB="0" anchor="b"/>
+                </a:tc>
+                <a:extLst>
+                  <a:ext uri="{0D108BD9-81ED-4DB2-BD59-A6C34878D82A}">
+                    <a16:rowId xmlns:a16="http://schemas.microsoft.com/office/drawing/2014/main" val="3514006710"/>
+                  </a:ext>
+                </a:extLst>
+              </a:tr>
+              <a:tr h="255495">
+                <a:tc>
+                  <a:txBody>
+                    <a:bodyPr/>
+                    <a:lstStyle/>
+                    <a:p>
+                      <a:pPr algn="l" fontAlgn="b"/>
+                      <a:endParaRPr lang="fr-FR" sz="1600" b="1" i="0" u="none" strike="noStrike">
+                        <a:solidFill>
+                          <a:srgbClr val="000000"/>
+                        </a:solidFill>
+                        <a:effectLst/>
+                        <a:latin typeface="Calibri" panose="020F0502020204030204" pitchFamily="34" charset="0"/>
+                      </a:endParaRPr>
+                    </a:p>
+                  </a:txBody>
+                  <a:tcPr marL="5359" marR="5359" marT="5359" marB="0" anchor="b"/>
+                </a:tc>
+                <a:tc>
+                  <a:txBody>
+                    <a:bodyPr/>
+                    <a:lstStyle/>
+                    <a:p>
+                      <a:pPr algn="l" fontAlgn="b"/>
+                      <a:endParaRPr lang="fr-FR" sz="1200" b="0" i="0" u="none" strike="noStrike">
+                        <a:solidFill>
+                          <a:srgbClr val="000000"/>
+                        </a:solidFill>
+                        <a:effectLst/>
+                        <a:latin typeface="Calibri" panose="020F0502020204030204" pitchFamily="34" charset="0"/>
+                      </a:endParaRPr>
+                    </a:p>
+                  </a:txBody>
+                  <a:tcPr marL="5359" marR="5359" marT="5359" marB="0" anchor="b"/>
+                </a:tc>
+                <a:extLst>
+                  <a:ext uri="{0D108BD9-81ED-4DB2-BD59-A6C34878D82A}">
+                    <a16:rowId xmlns:a16="http://schemas.microsoft.com/office/drawing/2014/main" val="3398816463"/>
+                  </a:ext>
+                </a:extLst>
+              </a:tr>
+              <a:tr h="255495">
+                <a:tc>
+                  <a:txBody>
+                    <a:bodyPr/>
+                    <a:lstStyle/>
+                    <a:p>
+                      <a:pPr algn="r" fontAlgn="b"/>
+                      <a:r>
+                        <a:rPr lang="fr-FR" sz="1600" u="none" strike="noStrike">
+                          <a:effectLst/>
+                        </a:rPr>
+                        <a:t>A0</a:t>
+                      </a:r>
+                      <a:endParaRPr lang="fr-FR" sz="1600" b="1" i="0" u="none" strike="noStrike">
+                        <a:solidFill>
+                          <a:srgbClr val="000000"/>
+                        </a:solidFill>
+                        <a:effectLst/>
+                        <a:latin typeface="Calibri" panose="020F0502020204030204" pitchFamily="34" charset="0"/>
+                      </a:endParaRPr>
+                    </a:p>
+                  </a:txBody>
+                  <a:tcPr marL="5359" marR="5359" marT="5359" marB="0" anchor="b"/>
+                </a:tc>
+                <a:tc>
+                  <a:txBody>
+                    <a:bodyPr/>
+                    <a:lstStyle/>
+                    <a:p>
+                      <a:pPr algn="l" fontAlgn="b"/>
+                      <a:endParaRPr lang="fr-FR" sz="1200" b="0" i="0" u="none" strike="noStrike">
+                        <a:solidFill>
+                          <a:srgbClr val="000000"/>
+                        </a:solidFill>
+                        <a:effectLst/>
+                        <a:latin typeface="Calibri" panose="020F0502020204030204" pitchFamily="34" charset="0"/>
+                      </a:endParaRPr>
+                    </a:p>
+                  </a:txBody>
+                  <a:tcPr marL="5359" marR="5359" marT="5359" marB="0" anchor="b"/>
+                </a:tc>
+                <a:extLst>
+                  <a:ext uri="{0D108BD9-81ED-4DB2-BD59-A6C34878D82A}">
+                    <a16:rowId xmlns:a16="http://schemas.microsoft.com/office/drawing/2014/main" val="3754507352"/>
+                  </a:ext>
+                </a:extLst>
+              </a:tr>
+              <a:tr h="255495">
+                <a:tc>
+                  <a:txBody>
+                    <a:bodyPr/>
+                    <a:lstStyle/>
+                    <a:p>
+                      <a:pPr algn="r" fontAlgn="b"/>
+                      <a:r>
+                        <a:rPr lang="fr-FR" sz="1600" u="none" strike="noStrike">
+                          <a:effectLst/>
+                        </a:rPr>
+                        <a:t>A1</a:t>
+                      </a:r>
+                      <a:endParaRPr lang="fr-FR" sz="1600" b="1" i="0" u="none" strike="noStrike">
+                        <a:solidFill>
+                          <a:srgbClr val="000000"/>
+                        </a:solidFill>
+                        <a:effectLst/>
+                        <a:latin typeface="Calibri" panose="020F0502020204030204" pitchFamily="34" charset="0"/>
+                      </a:endParaRPr>
+                    </a:p>
+                  </a:txBody>
+                  <a:tcPr marL="5359" marR="5359" marT="5359" marB="0" anchor="b"/>
+                </a:tc>
+                <a:tc>
+                  <a:txBody>
+                    <a:bodyPr/>
+                    <a:lstStyle/>
+                    <a:p>
+                      <a:pPr algn="l" fontAlgn="b"/>
+                      <a:endParaRPr lang="fr-FR" sz="1200" b="0" i="0" u="none" strike="noStrike">
+                        <a:solidFill>
+                          <a:srgbClr val="000000"/>
+                        </a:solidFill>
+                        <a:effectLst/>
+                        <a:latin typeface="Calibri" panose="020F0502020204030204" pitchFamily="34" charset="0"/>
+                      </a:endParaRPr>
+                    </a:p>
+                  </a:txBody>
+                  <a:tcPr marL="5359" marR="5359" marT="5359" marB="0" anchor="b"/>
+                </a:tc>
+                <a:extLst>
+                  <a:ext uri="{0D108BD9-81ED-4DB2-BD59-A6C34878D82A}">
+                    <a16:rowId xmlns:a16="http://schemas.microsoft.com/office/drawing/2014/main" val="1500133517"/>
+                  </a:ext>
+                </a:extLst>
+              </a:tr>
+              <a:tr h="255495">
+                <a:tc>
+                  <a:txBody>
+                    <a:bodyPr/>
+                    <a:lstStyle/>
+                    <a:p>
+                      <a:pPr algn="r" fontAlgn="b"/>
+                      <a:r>
+                        <a:rPr lang="fr-FR" sz="1600" u="none" strike="noStrike">
+                          <a:effectLst/>
+                        </a:rPr>
+                        <a:t>A2</a:t>
+                      </a:r>
+                      <a:endParaRPr lang="fr-FR" sz="1600" b="1" i="0" u="none" strike="noStrike">
+                        <a:solidFill>
+                          <a:srgbClr val="000000"/>
+                        </a:solidFill>
+                        <a:effectLst/>
+                        <a:latin typeface="Calibri" panose="020F0502020204030204" pitchFamily="34" charset="0"/>
+                      </a:endParaRPr>
+                    </a:p>
+                  </a:txBody>
+                  <a:tcPr marL="5359" marR="5359" marT="5359" marB="0" anchor="b"/>
+                </a:tc>
+                <a:tc>
+                  <a:txBody>
+                    <a:bodyPr/>
+                    <a:lstStyle/>
+                    <a:p>
+                      <a:pPr algn="l" fontAlgn="b"/>
+                      <a:r>
+                        <a:rPr lang="fr-FR" sz="1200" u="none" strike="noStrike">
+                          <a:effectLst/>
+                        </a:rPr>
+                        <a:t>WindDir</a:t>
+                      </a:r>
+                      <a:endParaRPr lang="fr-FR" sz="1200" b="0" i="0" u="none" strike="noStrike">
+                        <a:solidFill>
+                          <a:srgbClr val="000000"/>
+                        </a:solidFill>
+                        <a:effectLst/>
+                        <a:latin typeface="Calibri" panose="020F0502020204030204" pitchFamily="34" charset="0"/>
+                      </a:endParaRPr>
+                    </a:p>
+                  </a:txBody>
+                  <a:tcPr marL="5359" marR="5359" marT="5359" marB="0" anchor="b"/>
+                </a:tc>
+                <a:extLst>
+                  <a:ext uri="{0D108BD9-81ED-4DB2-BD59-A6C34878D82A}">
+                    <a16:rowId xmlns:a16="http://schemas.microsoft.com/office/drawing/2014/main" val="3903180743"/>
+                  </a:ext>
+                </a:extLst>
+              </a:tr>
+              <a:tr h="403246">
+                <a:tc>
+                  <a:txBody>
+                    <a:bodyPr/>
+                    <a:lstStyle/>
+                    <a:p>
+                      <a:pPr algn="r" fontAlgn="b"/>
+                      <a:r>
+                        <a:rPr lang="fr-FR" sz="1600" u="none" strike="noStrike">
+                          <a:effectLst/>
+                        </a:rPr>
+                        <a:t>A3</a:t>
+                      </a:r>
+                      <a:endParaRPr lang="fr-FR" sz="1600" b="1" i="0" u="none" strike="noStrike">
+                        <a:solidFill>
+                          <a:srgbClr val="000000"/>
+                        </a:solidFill>
+                        <a:effectLst/>
+                        <a:latin typeface="Calibri" panose="020F0502020204030204" pitchFamily="34" charset="0"/>
+                      </a:endParaRPr>
+                    </a:p>
+                  </a:txBody>
+                  <a:tcPr marL="5359" marR="5359" marT="5359" marB="0" anchor="b"/>
+                </a:tc>
+                <a:tc>
+                  <a:txBody>
+                    <a:bodyPr/>
+                    <a:lstStyle/>
+                    <a:p>
+                      <a:pPr algn="l" fontAlgn="b"/>
+                      <a:r>
+                        <a:rPr lang="en-US" sz="1200" u="none" strike="noStrike">
+                          <a:effectLst/>
+                        </a:rPr>
+                        <a:t>Ref 3,3V du low drop regulator</a:t>
+                      </a:r>
+                      <a:endParaRPr lang="en-US" sz="1200" b="0" i="0" u="none" strike="noStrike">
+                        <a:solidFill>
+                          <a:srgbClr val="000000"/>
+                        </a:solidFill>
+                        <a:effectLst/>
+                        <a:latin typeface="Calibri" panose="020F0502020204030204" pitchFamily="34" charset="0"/>
+                      </a:endParaRPr>
+                    </a:p>
+                  </a:txBody>
+                  <a:tcPr marL="5359" marR="5359" marT="5359" marB="0" anchor="b"/>
+                </a:tc>
+                <a:extLst>
+                  <a:ext uri="{0D108BD9-81ED-4DB2-BD59-A6C34878D82A}">
+                    <a16:rowId xmlns:a16="http://schemas.microsoft.com/office/drawing/2014/main" val="2593121018"/>
+                  </a:ext>
+                </a:extLst>
+              </a:tr>
+              <a:tr h="255495">
+                <a:tc>
+                  <a:txBody>
+                    <a:bodyPr/>
+                    <a:lstStyle/>
+                    <a:p>
+                      <a:pPr algn="r" fontAlgn="b"/>
+                      <a:r>
+                        <a:rPr lang="fr-FR" sz="1600" u="none" strike="noStrike">
+                          <a:effectLst/>
+                        </a:rPr>
+                        <a:t>A4</a:t>
+                      </a:r>
+                      <a:endParaRPr lang="fr-FR" sz="1600" b="1" i="0" u="none" strike="noStrike">
+                        <a:solidFill>
+                          <a:srgbClr val="000000"/>
+                        </a:solidFill>
+                        <a:effectLst/>
+                        <a:latin typeface="Calibri" panose="020F0502020204030204" pitchFamily="34" charset="0"/>
+                      </a:endParaRPr>
+                    </a:p>
+                  </a:txBody>
+                  <a:tcPr marL="5359" marR="5359" marT="5359" marB="0" anchor="b"/>
+                </a:tc>
+                <a:tc>
+                  <a:txBody>
+                    <a:bodyPr/>
+                    <a:lstStyle/>
+                    <a:p>
+                      <a:pPr algn="l" fontAlgn="b"/>
+                      <a:r>
+                        <a:rPr lang="fr-FR" sz="1200" u="none" strike="noStrike">
+                          <a:effectLst/>
+                        </a:rPr>
+                        <a:t>SDA</a:t>
+                      </a:r>
+                      <a:endParaRPr lang="fr-FR" sz="1200" b="0" i="0" u="none" strike="noStrike">
+                        <a:solidFill>
+                          <a:srgbClr val="000000"/>
+                        </a:solidFill>
+                        <a:effectLst/>
+                        <a:latin typeface="Calibri" panose="020F0502020204030204" pitchFamily="34" charset="0"/>
+                      </a:endParaRPr>
+                    </a:p>
+                  </a:txBody>
+                  <a:tcPr marL="5359" marR="5359" marT="5359" marB="0" anchor="b"/>
+                </a:tc>
+                <a:extLst>
+                  <a:ext uri="{0D108BD9-81ED-4DB2-BD59-A6C34878D82A}">
+                    <a16:rowId xmlns:a16="http://schemas.microsoft.com/office/drawing/2014/main" val="2085774392"/>
+                  </a:ext>
+                </a:extLst>
+              </a:tr>
+              <a:tr h="255495">
+                <a:tc>
+                  <a:txBody>
+                    <a:bodyPr/>
+                    <a:lstStyle/>
+                    <a:p>
+                      <a:pPr algn="r" fontAlgn="b"/>
+                      <a:r>
+                        <a:rPr lang="fr-FR" sz="1600" u="none" strike="noStrike">
+                          <a:effectLst/>
+                        </a:rPr>
+                        <a:t>A5</a:t>
+                      </a:r>
+                      <a:endParaRPr lang="fr-FR" sz="1600" b="1" i="0" u="none" strike="noStrike">
+                        <a:solidFill>
+                          <a:srgbClr val="000000"/>
+                        </a:solidFill>
+                        <a:effectLst/>
+                        <a:latin typeface="Calibri" panose="020F0502020204030204" pitchFamily="34" charset="0"/>
+                      </a:endParaRPr>
+                    </a:p>
+                  </a:txBody>
+                  <a:tcPr marL="5359" marR="5359" marT="5359" marB="0" anchor="b"/>
+                </a:tc>
+                <a:tc>
+                  <a:txBody>
+                    <a:bodyPr/>
+                    <a:lstStyle/>
+                    <a:p>
+                      <a:pPr algn="l" fontAlgn="b"/>
+                      <a:r>
+                        <a:rPr lang="fr-FR" sz="1200" u="none" strike="noStrike">
+                          <a:effectLst/>
+                        </a:rPr>
+                        <a:t>SCL</a:t>
+                      </a:r>
+                      <a:endParaRPr lang="fr-FR" sz="1200" b="0" i="0" u="none" strike="noStrike">
+                        <a:solidFill>
+                          <a:srgbClr val="000000"/>
+                        </a:solidFill>
+                        <a:effectLst/>
+                        <a:latin typeface="Calibri" panose="020F0502020204030204" pitchFamily="34" charset="0"/>
+                      </a:endParaRPr>
+                    </a:p>
+                  </a:txBody>
+                  <a:tcPr marL="5359" marR="5359" marT="5359" marB="0" anchor="b"/>
+                </a:tc>
+                <a:extLst>
+                  <a:ext uri="{0D108BD9-81ED-4DB2-BD59-A6C34878D82A}">
+                    <a16:rowId xmlns:a16="http://schemas.microsoft.com/office/drawing/2014/main" val="1357321137"/>
+                  </a:ext>
+                </a:extLst>
+              </a:tr>
+              <a:tr h="270772">
+                <a:tc>
+                  <a:txBody>
+                    <a:bodyPr/>
+                    <a:lstStyle/>
+                    <a:p>
+                      <a:pPr algn="r" fontAlgn="b"/>
+                      <a:r>
+                        <a:rPr lang="fr-FR" sz="1600" u="none" strike="noStrike">
+                          <a:effectLst/>
+                        </a:rPr>
+                        <a:t>A6</a:t>
+                      </a:r>
+                      <a:endParaRPr lang="fr-FR" sz="1600" b="1" i="0" u="none" strike="noStrike">
+                        <a:solidFill>
+                          <a:srgbClr val="000000"/>
+                        </a:solidFill>
+                        <a:effectLst/>
+                        <a:latin typeface="Calibri" panose="020F0502020204030204" pitchFamily="34" charset="0"/>
+                      </a:endParaRPr>
+                    </a:p>
+                  </a:txBody>
+                  <a:tcPr marL="5359" marR="5359" marT="5359" marB="0" anchor="b"/>
+                </a:tc>
+                <a:tc>
+                  <a:txBody>
+                    <a:bodyPr/>
+                    <a:lstStyle/>
+                    <a:p>
+                      <a:pPr algn="l" fontAlgn="b"/>
+                      <a:r>
+                        <a:rPr lang="fr-FR" sz="1200" u="none" strike="noStrike">
+                          <a:effectLst/>
+                        </a:rPr>
+                        <a:t>Battery temp</a:t>
+                      </a:r>
+                      <a:endParaRPr lang="fr-FR" sz="1200" b="0" i="0" u="none" strike="noStrike">
+                        <a:solidFill>
+                          <a:srgbClr val="000000"/>
+                        </a:solidFill>
+                        <a:effectLst/>
+                        <a:latin typeface="Calibri" panose="020F0502020204030204" pitchFamily="34" charset="0"/>
+                      </a:endParaRPr>
+                    </a:p>
+                  </a:txBody>
+                  <a:tcPr marL="5359" marR="5359" marT="5359" marB="0" anchor="b"/>
+                </a:tc>
+                <a:extLst>
+                  <a:ext uri="{0D108BD9-81ED-4DB2-BD59-A6C34878D82A}">
+                    <a16:rowId xmlns:a16="http://schemas.microsoft.com/office/drawing/2014/main" val="2372977089"/>
+                  </a:ext>
+                </a:extLst>
+              </a:tr>
+              <a:tr h="270772">
+                <a:tc>
+                  <a:txBody>
+                    <a:bodyPr/>
+                    <a:lstStyle/>
+                    <a:p>
+                      <a:pPr algn="r" fontAlgn="b"/>
+                      <a:r>
+                        <a:rPr lang="fr-FR" sz="1600" u="none" strike="noStrike">
+                          <a:effectLst/>
+                        </a:rPr>
+                        <a:t>A7</a:t>
+                      </a:r>
+                      <a:endParaRPr lang="fr-FR" sz="1600" b="1" i="0" u="none" strike="noStrike">
+                        <a:solidFill>
+                          <a:srgbClr val="000000"/>
+                        </a:solidFill>
+                        <a:effectLst/>
+                        <a:latin typeface="Calibri" panose="020F0502020204030204" pitchFamily="34" charset="0"/>
+                      </a:endParaRPr>
+                    </a:p>
+                  </a:txBody>
+                  <a:tcPr marL="5359" marR="5359" marT="5359" marB="0" anchor="b"/>
+                </a:tc>
+                <a:tc>
+                  <a:txBody>
+                    <a:bodyPr/>
+                    <a:lstStyle/>
+                    <a:p>
+                      <a:pPr algn="l" fontAlgn="b"/>
+                      <a:r>
+                        <a:rPr lang="fr-FR" sz="1200" u="none" strike="noStrike" dirty="0">
+                          <a:effectLst/>
+                        </a:rPr>
+                        <a:t>Battery Voltage</a:t>
+                      </a:r>
+                      <a:endParaRPr lang="fr-FR" sz="1200" b="0" i="0" u="none" strike="noStrike" dirty="0">
+                        <a:solidFill>
+                          <a:srgbClr val="000000"/>
+                        </a:solidFill>
+                        <a:effectLst/>
+                        <a:latin typeface="Calibri" panose="020F0502020204030204" pitchFamily="34" charset="0"/>
+                      </a:endParaRPr>
+                    </a:p>
+                  </a:txBody>
+                  <a:tcPr marL="5359" marR="5359" marT="5359" marB="0" anchor="b"/>
+                </a:tc>
+                <a:extLst>
+                  <a:ext uri="{0D108BD9-81ED-4DB2-BD59-A6C34878D82A}">
+                    <a16:rowId xmlns:a16="http://schemas.microsoft.com/office/drawing/2014/main" val="957506957"/>
+                  </a:ext>
+                </a:extLst>
+              </a:tr>
+            </a:tbl>
+          </a:graphicData>
+        </a:graphic>
+      </p:graphicFrame>
     </p:spTree>
     <p:extLst>
       <p:ext uri="{BB962C8B-B14F-4D97-AF65-F5344CB8AC3E}">

</xml_diff>